<commit_message>
Note Generation and Articulation Fix
- removed feed back of note articulation
- zero out articulation when note isn't played
- cleaned up note generation part.
- code has been debugged but model hasn't been trained with these fixes, yet
</commit_message>
<xml_diff>
--- a/Block_Diagrams/Block_Diagrams.pptx
+++ b/Block_Diagrams/Block_Diagrams.pptx
@@ -245,7 +245,7 @@
           <a:p>
             <a:fld id="{CC2ECBDD-C8DE-4B2D-A9F9-5A453D51301A}" type="datetimeFigureOut">
               <a:rPr lang="en-US" smtClean="0"/>
-              <a:t>12/12/2017</a:t>
+              <a:t>12/15/2017</a:t>
             </a:fld>
             <a:endParaRPr lang="en-US"/>
           </a:p>
@@ -415,7 +415,7 @@
           <a:p>
             <a:fld id="{CC2ECBDD-C8DE-4B2D-A9F9-5A453D51301A}" type="datetimeFigureOut">
               <a:rPr lang="en-US" smtClean="0"/>
-              <a:t>12/12/2017</a:t>
+              <a:t>12/15/2017</a:t>
             </a:fld>
             <a:endParaRPr lang="en-US"/>
           </a:p>
@@ -595,7 +595,7 @@
           <a:p>
             <a:fld id="{CC2ECBDD-C8DE-4B2D-A9F9-5A453D51301A}" type="datetimeFigureOut">
               <a:rPr lang="en-US" smtClean="0"/>
-              <a:t>12/12/2017</a:t>
+              <a:t>12/15/2017</a:t>
             </a:fld>
             <a:endParaRPr lang="en-US"/>
           </a:p>
@@ -765,7 +765,7 @@
           <a:p>
             <a:fld id="{CC2ECBDD-C8DE-4B2D-A9F9-5A453D51301A}" type="datetimeFigureOut">
               <a:rPr lang="en-US" smtClean="0"/>
-              <a:t>12/12/2017</a:t>
+              <a:t>12/15/2017</a:t>
             </a:fld>
             <a:endParaRPr lang="en-US"/>
           </a:p>
@@ -1011,7 +1011,7 @@
           <a:p>
             <a:fld id="{CC2ECBDD-C8DE-4B2D-A9F9-5A453D51301A}" type="datetimeFigureOut">
               <a:rPr lang="en-US" smtClean="0"/>
-              <a:t>12/12/2017</a:t>
+              <a:t>12/15/2017</a:t>
             </a:fld>
             <a:endParaRPr lang="en-US"/>
           </a:p>
@@ -1243,7 +1243,7 @@
           <a:p>
             <a:fld id="{CC2ECBDD-C8DE-4B2D-A9F9-5A453D51301A}" type="datetimeFigureOut">
               <a:rPr lang="en-US" smtClean="0"/>
-              <a:t>12/12/2017</a:t>
+              <a:t>12/15/2017</a:t>
             </a:fld>
             <a:endParaRPr lang="en-US"/>
           </a:p>
@@ -1610,7 +1610,7 @@
           <a:p>
             <a:fld id="{CC2ECBDD-C8DE-4B2D-A9F9-5A453D51301A}" type="datetimeFigureOut">
               <a:rPr lang="en-US" smtClean="0"/>
-              <a:t>12/12/2017</a:t>
+              <a:t>12/15/2017</a:t>
             </a:fld>
             <a:endParaRPr lang="en-US"/>
           </a:p>
@@ -1728,7 +1728,7 @@
           <a:p>
             <a:fld id="{CC2ECBDD-C8DE-4B2D-A9F9-5A453D51301A}" type="datetimeFigureOut">
               <a:rPr lang="en-US" smtClean="0"/>
-              <a:t>12/12/2017</a:t>
+              <a:t>12/15/2017</a:t>
             </a:fld>
             <a:endParaRPr lang="en-US"/>
           </a:p>
@@ -1823,7 +1823,7 @@
           <a:p>
             <a:fld id="{CC2ECBDD-C8DE-4B2D-A9F9-5A453D51301A}" type="datetimeFigureOut">
               <a:rPr lang="en-US" smtClean="0"/>
-              <a:t>12/12/2017</a:t>
+              <a:t>12/15/2017</a:t>
             </a:fld>
             <a:endParaRPr lang="en-US"/>
           </a:p>
@@ -2100,7 +2100,7 @@
           <a:p>
             <a:fld id="{CC2ECBDD-C8DE-4B2D-A9F9-5A453D51301A}" type="datetimeFigureOut">
               <a:rPr lang="en-US" smtClean="0"/>
-              <a:t>12/12/2017</a:t>
+              <a:t>12/15/2017</a:t>
             </a:fld>
             <a:endParaRPr lang="en-US"/>
           </a:p>
@@ -2353,7 +2353,7 @@
           <a:p>
             <a:fld id="{CC2ECBDD-C8DE-4B2D-A9F9-5A453D51301A}" type="datetimeFigureOut">
               <a:rPr lang="en-US" smtClean="0"/>
-              <a:t>12/12/2017</a:t>
+              <a:t>12/15/2017</a:t>
             </a:fld>
             <a:endParaRPr lang="en-US"/>
           </a:p>
@@ -2566,7 +2566,7 @@
           <a:p>
             <a:fld id="{CC2ECBDD-C8DE-4B2D-A9F9-5A453D51301A}" type="datetimeFigureOut">
               <a:rPr lang="en-US" smtClean="0"/>
-              <a:t>12/12/2017</a:t>
+              <a:t>12/15/2017</a:t>
             </a:fld>
             <a:endParaRPr lang="en-US"/>
           </a:p>

</xml_diff>